<commit_message>
update auto add title by markdown title
</commit_message>
<xml_diff>
--- a/slidetemp.pptx
+++ b/slidetemp.pptx
@@ -1,9 +1,12 @@
 
 <file path=ppt/presentation.xml><?xml version="1.0" encoding="utf-8"?>
-<p:presentation xmlns:a="http://schemas.openxmlformats.org/drawingml/2006/main" xmlns:r="http://schemas.openxmlformats.org/officeDocument/2006/relationships" xmlns:p="http://schemas.openxmlformats.org/presentationml/2006/main" saveSubsetFonts="1" autoCompressPictures="0">
+<p:presentation xmlns:a="http://schemas.openxmlformats.org/drawingml/2006/main" xmlns:r="http://schemas.openxmlformats.org/officeDocument/2006/relationships" xmlns:p="http://schemas.openxmlformats.org/presentationml/2006/main" showSpecialPlsOnTitleSld="0" saveSubsetFonts="1" autoCompressPictures="0">
   <p:sldMasterIdLst>
     <p:sldMasterId id="2147483648" r:id="rId1"/>
   </p:sldMasterIdLst>
+  <p:notesMasterIdLst>
+    <p:notesMasterId r:id="rId3"/>
+  </p:notesMasterIdLst>
   <p:sldIdLst>
     <p:sldId id="256" r:id="rId2"/>
   </p:sldIdLst>
@@ -112,6 +115,355 @@
 </p:presentation>
 </file>
 
+<file path=ppt/notesMasters/notesMaster1.xml><?xml version="1.0" encoding="utf-8"?>
+<p:notesMaster xmlns:a="http://schemas.openxmlformats.org/drawingml/2006/main" xmlns:r="http://schemas.openxmlformats.org/officeDocument/2006/relationships" xmlns:p="http://schemas.openxmlformats.org/presentationml/2006/main">
+  <p:cSld>
+    <p:bg>
+      <p:bgRef idx="1001">
+        <a:schemeClr val="bg1"/>
+      </p:bgRef>
+    </p:bg>
+    <p:spTree>
+      <p:nvGrpSpPr>
+        <p:cNvPr id="1" name=""/>
+        <p:cNvGrpSpPr/>
+        <p:nvPr/>
+      </p:nvGrpSpPr>
+      <p:grpSpPr>
+        <a:xfrm>
+          <a:off x="0" y="0"/>
+          <a:ext cx="0" cy="0"/>
+          <a:chOff x="0" y="0"/>
+          <a:chExt cx="0" cy="0"/>
+        </a:xfrm>
+      </p:grpSpPr>
+      <p:sp>
+        <p:nvSpPr>
+          <p:cNvPr id="2" name="頁首版面配置區 1"/>
+          <p:cNvSpPr>
+            <a:spLocks noGrp="1"/>
+          </p:cNvSpPr>
+          <p:nvPr>
+            <p:ph type="hdr" sz="quarter"/>
+          </p:nvPr>
+        </p:nvSpPr>
+        <p:spPr>
+          <a:xfrm>
+            <a:off x="0" y="0"/>
+            <a:ext cx="2971800" cy="458788"/>
+          </a:xfrm>
+          <a:prstGeom prst="rect">
+            <a:avLst/>
+          </a:prstGeom>
+        </p:spPr>
+        <p:txBody>
+          <a:bodyPr vert="horz" lIns="91440" tIns="45720" rIns="91440" bIns="45720" rtlCol="0"/>
+          <a:lstStyle>
+            <a:lvl1pPr algn="l">
+              <a:defRPr sz="1200"/>
+            </a:lvl1pPr>
+          </a:lstStyle>
+          <a:p>
+            <a:endParaRPr kumimoji="1" lang="zh-TW" altLang="en-US"/>
+          </a:p>
+        </p:txBody>
+      </p:sp>
+      <p:sp>
+        <p:nvSpPr>
+          <p:cNvPr id="3" name="日期版面配置區 2"/>
+          <p:cNvSpPr>
+            <a:spLocks noGrp="1"/>
+          </p:cNvSpPr>
+          <p:nvPr>
+            <p:ph type="dt" idx="1"/>
+          </p:nvPr>
+        </p:nvSpPr>
+        <p:spPr>
+          <a:xfrm>
+            <a:off x="3884613" y="0"/>
+            <a:ext cx="2971800" cy="458788"/>
+          </a:xfrm>
+          <a:prstGeom prst="rect">
+            <a:avLst/>
+          </a:prstGeom>
+        </p:spPr>
+        <p:txBody>
+          <a:bodyPr vert="horz" lIns="91440" tIns="45720" rIns="91440" bIns="45720" rtlCol="0"/>
+          <a:lstStyle>
+            <a:lvl1pPr algn="r">
+              <a:defRPr sz="1200"/>
+            </a:lvl1pPr>
+          </a:lstStyle>
+          <a:p>
+            <a:fld id="{8B2C1FF7-3CD2-7848-AA02-AAC2E9ACC631}" type="datetimeFigureOut">
+              <a:rPr kumimoji="1" lang="zh-TW" altLang="en-US" smtClean="0"/>
+              <a:t>2022/10/21</a:t>
+            </a:fld>
+            <a:endParaRPr kumimoji="1" lang="zh-TW" altLang="en-US"/>
+          </a:p>
+        </p:txBody>
+      </p:sp>
+      <p:sp>
+        <p:nvSpPr>
+          <p:cNvPr id="4" name="投影片影像版面配置區 3"/>
+          <p:cNvSpPr>
+            <a:spLocks noGrp="1" noRot="1" noChangeAspect="1"/>
+          </p:cNvSpPr>
+          <p:nvPr>
+            <p:ph type="sldImg" idx="2"/>
+          </p:nvPr>
+        </p:nvSpPr>
+        <p:spPr>
+          <a:xfrm>
+            <a:off x="685800" y="1143000"/>
+            <a:ext cx="5486400" cy="3086100"/>
+          </a:xfrm>
+          <a:prstGeom prst="rect">
+            <a:avLst/>
+          </a:prstGeom>
+          <a:noFill/>
+          <a:ln w="12700">
+            <a:solidFill>
+              <a:prstClr val="black"/>
+            </a:solidFill>
+          </a:ln>
+        </p:spPr>
+        <p:txBody>
+          <a:bodyPr vert="horz" lIns="91440" tIns="45720" rIns="91440" bIns="45720" rtlCol="0" anchor="ctr"/>
+          <a:lstStyle/>
+          <a:p>
+            <a:endParaRPr lang="zh-TW" altLang="en-US"/>
+          </a:p>
+        </p:txBody>
+      </p:sp>
+      <p:sp>
+        <p:nvSpPr>
+          <p:cNvPr id="5" name="備忘稿版面配置區 4"/>
+          <p:cNvSpPr>
+            <a:spLocks noGrp="1"/>
+          </p:cNvSpPr>
+          <p:nvPr>
+            <p:ph type="body" sz="quarter" idx="3"/>
+          </p:nvPr>
+        </p:nvSpPr>
+        <p:spPr>
+          <a:xfrm>
+            <a:off x="685800" y="4400550"/>
+            <a:ext cx="5486400" cy="3600450"/>
+          </a:xfrm>
+          <a:prstGeom prst="rect">
+            <a:avLst/>
+          </a:prstGeom>
+        </p:spPr>
+        <p:txBody>
+          <a:bodyPr vert="horz" lIns="91440" tIns="45720" rIns="91440" bIns="45720" rtlCol="0"/>
+          <a:lstStyle/>
+          <a:p>
+            <a:pPr lvl="0"/>
+            <a:r>
+              <a:rPr kumimoji="1" lang="zh-TW" altLang="en-US"/>
+              <a:t>按一下以編輯母片文字樣式</a:t>
+            </a:r>
+          </a:p>
+          <a:p>
+            <a:pPr lvl="1"/>
+            <a:r>
+              <a:rPr kumimoji="1" lang="zh-TW" altLang="en-US"/>
+              <a:t>第二層</a:t>
+            </a:r>
+          </a:p>
+          <a:p>
+            <a:pPr lvl="2"/>
+            <a:r>
+              <a:rPr kumimoji="1" lang="zh-TW" altLang="en-US"/>
+              <a:t>第三層</a:t>
+            </a:r>
+          </a:p>
+          <a:p>
+            <a:pPr lvl="3"/>
+            <a:r>
+              <a:rPr kumimoji="1" lang="zh-TW" altLang="en-US"/>
+              <a:t>第四層</a:t>
+            </a:r>
+          </a:p>
+          <a:p>
+            <a:pPr lvl="4"/>
+            <a:r>
+              <a:rPr kumimoji="1" lang="zh-TW" altLang="en-US"/>
+              <a:t>第五層</a:t>
+            </a:r>
+          </a:p>
+        </p:txBody>
+      </p:sp>
+      <p:sp>
+        <p:nvSpPr>
+          <p:cNvPr id="6" name="頁尾版面配置區 5"/>
+          <p:cNvSpPr>
+            <a:spLocks noGrp="1"/>
+          </p:cNvSpPr>
+          <p:nvPr>
+            <p:ph type="ftr" sz="quarter" idx="4"/>
+          </p:nvPr>
+        </p:nvSpPr>
+        <p:spPr>
+          <a:xfrm>
+            <a:off x="0" y="8685213"/>
+            <a:ext cx="2971800" cy="458787"/>
+          </a:xfrm>
+          <a:prstGeom prst="rect">
+            <a:avLst/>
+          </a:prstGeom>
+        </p:spPr>
+        <p:txBody>
+          <a:bodyPr vert="horz" lIns="91440" tIns="45720" rIns="91440" bIns="45720" rtlCol="0" anchor="b"/>
+          <a:lstStyle>
+            <a:lvl1pPr algn="l">
+              <a:defRPr sz="1200"/>
+            </a:lvl1pPr>
+          </a:lstStyle>
+          <a:p>
+            <a:endParaRPr kumimoji="1" lang="zh-TW" altLang="en-US"/>
+          </a:p>
+        </p:txBody>
+      </p:sp>
+      <p:sp>
+        <p:nvSpPr>
+          <p:cNvPr id="7" name="投影片編號版面配置區 6"/>
+          <p:cNvSpPr>
+            <a:spLocks noGrp="1"/>
+          </p:cNvSpPr>
+          <p:nvPr>
+            <p:ph type="sldNum" sz="quarter" idx="5"/>
+          </p:nvPr>
+        </p:nvSpPr>
+        <p:spPr>
+          <a:xfrm>
+            <a:off x="3884613" y="8685213"/>
+            <a:ext cx="2971800" cy="458787"/>
+          </a:xfrm>
+          <a:prstGeom prst="rect">
+            <a:avLst/>
+          </a:prstGeom>
+        </p:spPr>
+        <p:txBody>
+          <a:bodyPr vert="horz" lIns="91440" tIns="45720" rIns="91440" bIns="45720" rtlCol="0" anchor="b"/>
+          <a:lstStyle>
+            <a:lvl1pPr algn="r">
+              <a:defRPr sz="1200"/>
+            </a:lvl1pPr>
+          </a:lstStyle>
+          <a:p>
+            <a:fld id="{B752E626-D61B-3349-A305-E6C623A40CA1}" type="slidenum">
+              <a:rPr kumimoji="1" lang="zh-TW" altLang="en-US" smtClean="0"/>
+              <a:t>‹#›</a:t>
+            </a:fld>
+            <a:endParaRPr kumimoji="1" lang="zh-TW" altLang="en-US"/>
+          </a:p>
+        </p:txBody>
+      </p:sp>
+    </p:spTree>
+    <p:extLst>
+      <p:ext uri="{BB962C8B-B14F-4D97-AF65-F5344CB8AC3E}">
+        <p14:creationId xmlns:p14="http://schemas.microsoft.com/office/powerpoint/2010/main" val="2076163215"/>
+      </p:ext>
+    </p:extLst>
+  </p:cSld>
+  <p:clrMap bg1="lt1" tx1="dk1" bg2="lt2" tx2="dk2" accent1="accent1" accent2="accent2" accent3="accent3" accent4="accent4" accent5="accent5" accent6="accent6" hlink="hlink" folHlink="folHlink"/>
+  <p:notesStyle>
+    <a:lvl1pPr marL="0" algn="l" defTabSz="914400" rtl="0" eaLnBrk="1" latinLnBrk="0" hangingPunct="1">
+      <a:defRPr sz="1200" kern="1200">
+        <a:solidFill>
+          <a:schemeClr val="tx1"/>
+        </a:solidFill>
+        <a:latin typeface="+mn-lt"/>
+        <a:ea typeface="+mn-ea"/>
+        <a:cs typeface="+mn-cs"/>
+      </a:defRPr>
+    </a:lvl1pPr>
+    <a:lvl2pPr marL="457200" algn="l" defTabSz="914400" rtl="0" eaLnBrk="1" latinLnBrk="0" hangingPunct="1">
+      <a:defRPr sz="1200" kern="1200">
+        <a:solidFill>
+          <a:schemeClr val="tx1"/>
+        </a:solidFill>
+        <a:latin typeface="+mn-lt"/>
+        <a:ea typeface="+mn-ea"/>
+        <a:cs typeface="+mn-cs"/>
+      </a:defRPr>
+    </a:lvl2pPr>
+    <a:lvl3pPr marL="914400" algn="l" defTabSz="914400" rtl="0" eaLnBrk="1" latinLnBrk="0" hangingPunct="1">
+      <a:defRPr sz="1200" kern="1200">
+        <a:solidFill>
+          <a:schemeClr val="tx1"/>
+        </a:solidFill>
+        <a:latin typeface="+mn-lt"/>
+        <a:ea typeface="+mn-ea"/>
+        <a:cs typeface="+mn-cs"/>
+      </a:defRPr>
+    </a:lvl3pPr>
+    <a:lvl4pPr marL="1371600" algn="l" defTabSz="914400" rtl="0" eaLnBrk="1" latinLnBrk="0" hangingPunct="1">
+      <a:defRPr sz="1200" kern="1200">
+        <a:solidFill>
+          <a:schemeClr val="tx1"/>
+        </a:solidFill>
+        <a:latin typeface="+mn-lt"/>
+        <a:ea typeface="+mn-ea"/>
+        <a:cs typeface="+mn-cs"/>
+      </a:defRPr>
+    </a:lvl4pPr>
+    <a:lvl5pPr marL="1828800" algn="l" defTabSz="914400" rtl="0" eaLnBrk="1" latinLnBrk="0" hangingPunct="1">
+      <a:defRPr sz="1200" kern="1200">
+        <a:solidFill>
+          <a:schemeClr val="tx1"/>
+        </a:solidFill>
+        <a:latin typeface="+mn-lt"/>
+        <a:ea typeface="+mn-ea"/>
+        <a:cs typeface="+mn-cs"/>
+      </a:defRPr>
+    </a:lvl5pPr>
+    <a:lvl6pPr marL="2286000" algn="l" defTabSz="914400" rtl="0" eaLnBrk="1" latinLnBrk="0" hangingPunct="1">
+      <a:defRPr sz="1200" kern="1200">
+        <a:solidFill>
+          <a:schemeClr val="tx1"/>
+        </a:solidFill>
+        <a:latin typeface="+mn-lt"/>
+        <a:ea typeface="+mn-ea"/>
+        <a:cs typeface="+mn-cs"/>
+      </a:defRPr>
+    </a:lvl6pPr>
+    <a:lvl7pPr marL="2743200" algn="l" defTabSz="914400" rtl="0" eaLnBrk="1" latinLnBrk="0" hangingPunct="1">
+      <a:defRPr sz="1200" kern="1200">
+        <a:solidFill>
+          <a:schemeClr val="tx1"/>
+        </a:solidFill>
+        <a:latin typeface="+mn-lt"/>
+        <a:ea typeface="+mn-ea"/>
+        <a:cs typeface="+mn-cs"/>
+      </a:defRPr>
+    </a:lvl7pPr>
+    <a:lvl8pPr marL="3200400" algn="l" defTabSz="914400" rtl="0" eaLnBrk="1" latinLnBrk="0" hangingPunct="1">
+      <a:defRPr sz="1200" kern="1200">
+        <a:solidFill>
+          <a:schemeClr val="tx1"/>
+        </a:solidFill>
+        <a:latin typeface="+mn-lt"/>
+        <a:ea typeface="+mn-ea"/>
+        <a:cs typeface="+mn-cs"/>
+      </a:defRPr>
+    </a:lvl8pPr>
+    <a:lvl9pPr marL="3657600" algn="l" defTabSz="914400" rtl="0" eaLnBrk="1" latinLnBrk="0" hangingPunct="1">
+      <a:defRPr sz="1200" kern="1200">
+        <a:solidFill>
+          <a:schemeClr val="tx1"/>
+        </a:solidFill>
+        <a:latin typeface="+mn-lt"/>
+        <a:ea typeface="+mn-ea"/>
+        <a:cs typeface="+mn-cs"/>
+      </a:defRPr>
+    </a:lvl9pPr>
+  </p:notesStyle>
+</p:notesMaster>
+</file>
+
 <file path=ppt/slideLayouts/slideLayout1.xml><?xml version="1.0" encoding="utf-8"?>
 <p:sldLayout xmlns:a="http://schemas.openxmlformats.org/drawingml/2006/main" xmlns:r="http://schemas.openxmlformats.org/officeDocument/2006/relationships" xmlns:p="http://schemas.openxmlformats.org/presentationml/2006/main" type="title" preserve="1">
   <p:cSld name="Title Slide">
@@ -155,12 +507,16 @@
           <a:bodyPr anchor="b"/>
           <a:lstStyle>
             <a:lvl1pPr algn="ctr">
-              <a:defRPr sz="6000"/>
+              <a:defRPr sz="6000">
+                <a:solidFill>
+                  <a:srgbClr val="C00000"/>
+                </a:solidFill>
+              </a:defRPr>
             </a:lvl1pPr>
           </a:lstStyle>
           <a:p>
             <a:r>
-              <a:rPr kumimoji="1" lang="zh-TW" altLang="en-US"/>
+              <a:rPr kumimoji="1" lang="zh-TW" altLang="en-US" dirty="0"/>
               <a:t>按一下以編輯母片標題樣式</a:t>
             </a:r>
           </a:p>
@@ -257,9 +613,9 @@
           <a:bodyPr/>
           <a:lstStyle/>
           <a:p>
-            <a:fld id="{C1E18A28-2211-8445-951F-7FB6C7D14141}" type="datetimeFigureOut">
+            <a:fld id="{6B6E8288-18DC-6748-8F07-FCE7E33E0387}" type="datetime1">
               <a:rPr kumimoji="1" lang="zh-TW" altLang="en-US" smtClean="0"/>
-              <a:t>2022/10/18</a:t>
+              <a:t>2022/10/21</a:t>
             </a:fld>
             <a:endParaRPr kumimoji="1" lang="zh-TW" altLang="en-US"/>
           </a:p>
@@ -286,7 +642,10 @@
           <a:bodyPr/>
           <a:lstStyle/>
           <a:p>
-            <a:endParaRPr kumimoji="1" lang="zh-TW" altLang="en-US"/>
+            <a:r>
+              <a:rPr kumimoji="1" lang="zh-TW" altLang="en-US" dirty="0"/>
+              <a:t>蜥蜴出品</a:t>
+            </a:r>
           </a:p>
         </p:txBody>
       </p:sp>
@@ -460,9 +819,9 @@
           <a:bodyPr/>
           <a:lstStyle/>
           <a:p>
-            <a:fld id="{C1E18A28-2211-8445-951F-7FB6C7D14141}" type="datetimeFigureOut">
+            <a:fld id="{0E590ADA-43E4-064B-9A8D-5A88906B8E29}" type="datetime1">
               <a:rPr kumimoji="1" lang="zh-TW" altLang="en-US" smtClean="0"/>
-              <a:t>2022/10/18</a:t>
+              <a:t>2022/10/21</a:t>
             </a:fld>
             <a:endParaRPr kumimoji="1" lang="zh-TW" altLang="en-US"/>
           </a:p>
@@ -489,7 +848,10 @@
           <a:bodyPr/>
           <a:lstStyle/>
           <a:p>
-            <a:endParaRPr kumimoji="1" lang="zh-TW" altLang="en-US"/>
+            <a:r>
+              <a:rPr kumimoji="1" lang="zh-TW" altLang="en-US"/>
+              <a:t>蜥蜴出品</a:t>
+            </a:r>
           </a:p>
         </p:txBody>
       </p:sp>
@@ -668,9 +1030,9 @@
           <a:bodyPr/>
           <a:lstStyle/>
           <a:p>
-            <a:fld id="{C1E18A28-2211-8445-951F-7FB6C7D14141}" type="datetimeFigureOut">
+            <a:fld id="{FBDCD0F0-79F6-E345-907A-13DAB23A575A}" type="datetime1">
               <a:rPr kumimoji="1" lang="zh-TW" altLang="en-US" smtClean="0"/>
-              <a:t>2022/10/18</a:t>
+              <a:t>2022/10/21</a:t>
             </a:fld>
             <a:endParaRPr kumimoji="1" lang="zh-TW" altLang="en-US"/>
           </a:p>
@@ -697,7 +1059,10 @@
           <a:bodyPr/>
           <a:lstStyle/>
           <a:p>
-            <a:endParaRPr kumimoji="1" lang="zh-TW" altLang="en-US"/>
+            <a:r>
+              <a:rPr kumimoji="1" lang="zh-TW" altLang="en-US"/>
+              <a:t>蜥蜴出品</a:t>
+            </a:r>
           </a:p>
         </p:txBody>
       </p:sp>
@@ -866,9 +1231,9 @@
           <a:bodyPr/>
           <a:lstStyle/>
           <a:p>
-            <a:fld id="{C1E18A28-2211-8445-951F-7FB6C7D14141}" type="datetimeFigureOut">
+            <a:fld id="{A0215A02-CC4D-C447-92DE-E9526678BE8F}" type="datetime1">
               <a:rPr kumimoji="1" lang="zh-TW" altLang="en-US" smtClean="0"/>
-              <a:t>2022/10/18</a:t>
+              <a:t>2022/10/21</a:t>
             </a:fld>
             <a:endParaRPr kumimoji="1" lang="zh-TW" altLang="en-US"/>
           </a:p>
@@ -895,7 +1260,10 @@
           <a:bodyPr/>
           <a:lstStyle/>
           <a:p>
-            <a:endParaRPr kumimoji="1" lang="zh-TW" altLang="en-US"/>
+            <a:r>
+              <a:rPr kumimoji="1" lang="zh-TW" altLang="en-US"/>
+              <a:t>蜥蜴出品</a:t>
+            </a:r>
           </a:p>
         </p:txBody>
       </p:sp>
@@ -1141,9 +1509,9 @@
           <a:bodyPr/>
           <a:lstStyle/>
           <a:p>
-            <a:fld id="{C1E18A28-2211-8445-951F-7FB6C7D14141}" type="datetimeFigureOut">
+            <a:fld id="{7E85531B-CCE9-E041-8166-675B4B46487C}" type="datetime1">
               <a:rPr kumimoji="1" lang="zh-TW" altLang="en-US" smtClean="0"/>
-              <a:t>2022/10/18</a:t>
+              <a:t>2022/10/21</a:t>
             </a:fld>
             <a:endParaRPr kumimoji="1" lang="zh-TW" altLang="en-US"/>
           </a:p>
@@ -1170,7 +1538,10 @@
           <a:bodyPr/>
           <a:lstStyle/>
           <a:p>
-            <a:endParaRPr kumimoji="1" lang="zh-TW" altLang="en-US"/>
+            <a:r>
+              <a:rPr kumimoji="1" lang="zh-TW" altLang="en-US"/>
+              <a:t>蜥蜴出品</a:t>
+            </a:r>
           </a:p>
         </p:txBody>
       </p:sp>
@@ -1406,9 +1777,9 @@
           <a:bodyPr/>
           <a:lstStyle/>
           <a:p>
-            <a:fld id="{C1E18A28-2211-8445-951F-7FB6C7D14141}" type="datetimeFigureOut">
+            <a:fld id="{10E1F5DC-AE57-884A-8A7B-6146B7C0EFB4}" type="datetime1">
               <a:rPr kumimoji="1" lang="zh-TW" altLang="en-US" smtClean="0"/>
-              <a:t>2022/10/18</a:t>
+              <a:t>2022/10/21</a:t>
             </a:fld>
             <a:endParaRPr kumimoji="1" lang="zh-TW" altLang="en-US"/>
           </a:p>
@@ -1435,7 +1806,10 @@
           <a:bodyPr/>
           <a:lstStyle/>
           <a:p>
-            <a:endParaRPr kumimoji="1" lang="zh-TW" altLang="en-US"/>
+            <a:r>
+              <a:rPr kumimoji="1" lang="zh-TW" altLang="en-US"/>
+              <a:t>蜥蜴出品</a:t>
+            </a:r>
           </a:p>
         </p:txBody>
       </p:sp>
@@ -1818,9 +2192,9 @@
           <a:bodyPr/>
           <a:lstStyle/>
           <a:p>
-            <a:fld id="{C1E18A28-2211-8445-951F-7FB6C7D14141}" type="datetimeFigureOut">
+            <a:fld id="{587334C5-09FA-594C-95E1-F7D858B8824A}" type="datetime1">
               <a:rPr kumimoji="1" lang="zh-TW" altLang="en-US" smtClean="0"/>
-              <a:t>2022/10/18</a:t>
+              <a:t>2022/10/21</a:t>
             </a:fld>
             <a:endParaRPr kumimoji="1" lang="zh-TW" altLang="en-US"/>
           </a:p>
@@ -1847,7 +2221,10 @@
           <a:bodyPr/>
           <a:lstStyle/>
           <a:p>
-            <a:endParaRPr kumimoji="1" lang="zh-TW" altLang="en-US"/>
+            <a:r>
+              <a:rPr kumimoji="1" lang="zh-TW" altLang="en-US"/>
+              <a:t>蜥蜴出品</a:t>
+            </a:r>
           </a:p>
         </p:txBody>
       </p:sp>
@@ -1959,9 +2336,9 @@
           <a:bodyPr/>
           <a:lstStyle/>
           <a:p>
-            <a:fld id="{C1E18A28-2211-8445-951F-7FB6C7D14141}" type="datetimeFigureOut">
+            <a:fld id="{5F45E731-440C-5242-9E41-A519B8073901}" type="datetime1">
               <a:rPr kumimoji="1" lang="zh-TW" altLang="en-US" smtClean="0"/>
-              <a:t>2022/10/18</a:t>
+              <a:t>2022/10/21</a:t>
             </a:fld>
             <a:endParaRPr kumimoji="1" lang="zh-TW" altLang="en-US"/>
           </a:p>
@@ -1988,7 +2365,10 @@
           <a:bodyPr/>
           <a:lstStyle/>
           <a:p>
-            <a:endParaRPr kumimoji="1" lang="zh-TW" altLang="en-US"/>
+            <a:r>
+              <a:rPr kumimoji="1" lang="zh-TW" altLang="en-US"/>
+              <a:t>蜥蜴出品</a:t>
+            </a:r>
           </a:p>
         </p:txBody>
       </p:sp>
@@ -2072,9 +2452,9 @@
           <a:bodyPr/>
           <a:lstStyle/>
           <a:p>
-            <a:fld id="{C1E18A28-2211-8445-951F-7FB6C7D14141}" type="datetimeFigureOut">
+            <a:fld id="{F3396B5F-4602-D844-85E9-A35B87FB848E}" type="datetime1">
               <a:rPr kumimoji="1" lang="zh-TW" altLang="en-US" smtClean="0"/>
-              <a:t>2022/10/18</a:t>
+              <a:t>2022/10/21</a:t>
             </a:fld>
             <a:endParaRPr kumimoji="1" lang="zh-TW" altLang="en-US"/>
           </a:p>
@@ -2101,7 +2481,10 @@
           <a:bodyPr/>
           <a:lstStyle/>
           <a:p>
-            <a:endParaRPr kumimoji="1" lang="zh-TW" altLang="en-US"/>
+            <a:r>
+              <a:rPr kumimoji="1" lang="zh-TW" altLang="en-US"/>
+              <a:t>蜥蜴出品</a:t>
+            </a:r>
           </a:p>
         </p:txBody>
       </p:sp>
@@ -2388,9 +2771,9 @@
           <a:bodyPr/>
           <a:lstStyle/>
           <a:p>
-            <a:fld id="{C1E18A28-2211-8445-951F-7FB6C7D14141}" type="datetimeFigureOut">
+            <a:fld id="{0ED98EBB-8707-6242-92E0-8DE05B76A49C}" type="datetime1">
               <a:rPr kumimoji="1" lang="zh-TW" altLang="en-US" smtClean="0"/>
-              <a:t>2022/10/18</a:t>
+              <a:t>2022/10/21</a:t>
             </a:fld>
             <a:endParaRPr kumimoji="1" lang="zh-TW" altLang="en-US"/>
           </a:p>
@@ -2417,7 +2800,10 @@
           <a:bodyPr/>
           <a:lstStyle/>
           <a:p>
-            <a:endParaRPr kumimoji="1" lang="zh-TW" altLang="en-US"/>
+            <a:r>
+              <a:rPr kumimoji="1" lang="zh-TW" altLang="en-US"/>
+              <a:t>蜥蜴出品</a:t>
+            </a:r>
           </a:p>
         </p:txBody>
       </p:sp>
@@ -2676,9 +3062,9 @@
           <a:bodyPr/>
           <a:lstStyle/>
           <a:p>
-            <a:fld id="{C1E18A28-2211-8445-951F-7FB6C7D14141}" type="datetimeFigureOut">
+            <a:fld id="{20FE636C-0ADD-4D43-84F1-CB39BD3070E6}" type="datetime1">
               <a:rPr kumimoji="1" lang="zh-TW" altLang="en-US" smtClean="0"/>
-              <a:t>2022/10/18</a:t>
+              <a:t>2022/10/21</a:t>
             </a:fld>
             <a:endParaRPr kumimoji="1" lang="zh-TW" altLang="en-US"/>
           </a:p>
@@ -2705,7 +3091,10 @@
           <a:bodyPr/>
           <a:lstStyle/>
           <a:p>
-            <a:endParaRPr kumimoji="1" lang="zh-TW" altLang="en-US"/>
+            <a:r>
+              <a:rPr kumimoji="1" lang="zh-TW" altLang="en-US"/>
+              <a:t>蜥蜴出品</a:t>
+            </a:r>
           </a:p>
         </p:txBody>
       </p:sp>
@@ -2917,9 +3306,9 @@
             </a:lvl1pPr>
           </a:lstStyle>
           <a:p>
-            <a:fld id="{C1E18A28-2211-8445-951F-7FB6C7D14141}" type="datetimeFigureOut">
+            <a:fld id="{01AF8313-9347-FA4B-8E7E-62CCBCA813E5}" type="datetime1">
               <a:rPr kumimoji="1" lang="zh-TW" altLang="en-US" smtClean="0"/>
-              <a:t>2022/10/18</a:t>
+              <a:t>2022/10/21</a:t>
             </a:fld>
             <a:endParaRPr kumimoji="1" lang="zh-TW" altLang="en-US"/>
           </a:p>
@@ -2964,7 +3353,10 @@
             </a:lvl1pPr>
           </a:lstStyle>
           <a:p>
-            <a:endParaRPr kumimoji="1" lang="zh-TW" altLang="en-US"/>
+            <a:r>
+              <a:rPr kumimoji="1" lang="zh-TW" altLang="en-US"/>
+              <a:t>蜥蜴出品</a:t>
+            </a:r>
           </a:p>
         </p:txBody>
       </p:sp>
@@ -3035,6 +3427,7 @@
     <p:sldLayoutId id="2147483658" r:id="rId10"/>
     <p:sldLayoutId id="2147483659" r:id="rId11"/>
   </p:sldLayoutIdLst>
+  <p:hf hdr="0" dt="0"/>
   <p:txStyles>
     <p:titleStyle>
       <a:lvl1pPr algn="l" defTabSz="914400" rtl="0" eaLnBrk="1" latinLnBrk="0" hangingPunct="1">
@@ -3058,7 +3451,7 @@
     <p:bodyStyle>
       <a:lvl1pPr marL="228600" indent="-228600" algn="l" defTabSz="914400" rtl="0" eaLnBrk="1" latinLnBrk="0" hangingPunct="1">
         <a:lnSpc>
-          <a:spcPct val="90000"/>
+          <a:spcPct val="150000"/>
         </a:lnSpc>
         <a:spcBef>
           <a:spcPts val="1000"/>
@@ -3079,7 +3472,7 @@
       </a:lvl1pPr>
       <a:lvl2pPr marL="685800" indent="-228600" algn="l" defTabSz="914400" rtl="0" eaLnBrk="1" latinLnBrk="0" hangingPunct="1">
         <a:lnSpc>
-          <a:spcPct val="90000"/>
+          <a:spcPct val="150000"/>
         </a:lnSpc>
         <a:spcBef>
           <a:spcPts val="500"/>
@@ -3100,7 +3493,7 @@
       </a:lvl2pPr>
       <a:lvl3pPr marL="1143000" indent="-228600" algn="l" defTabSz="914400" rtl="0" eaLnBrk="1" latinLnBrk="0" hangingPunct="1">
         <a:lnSpc>
-          <a:spcPct val="90000"/>
+          <a:spcPct val="150000"/>
         </a:lnSpc>
         <a:spcBef>
           <a:spcPts val="500"/>
@@ -3121,7 +3514,7 @@
       </a:lvl3pPr>
       <a:lvl4pPr marL="1600200" indent="-228600" algn="l" defTabSz="914400" rtl="0" eaLnBrk="1" latinLnBrk="0" hangingPunct="1">
         <a:lnSpc>
-          <a:spcPct val="90000"/>
+          <a:spcPct val="150000"/>
         </a:lnSpc>
         <a:spcBef>
           <a:spcPts val="500"/>
@@ -3142,7 +3535,7 @@
       </a:lvl4pPr>
       <a:lvl5pPr marL="2057400" indent="-228600" algn="l" defTabSz="914400" rtl="0" eaLnBrk="1" latinLnBrk="0" hangingPunct="1">
         <a:lnSpc>
-          <a:spcPct val="90000"/>
+          <a:spcPct val="150000"/>
         </a:lnSpc>
         <a:spcBef>
           <a:spcPts val="500"/>
@@ -3706,4 +4099,299 @@
     </a:ext>
   </a:extLst>
 </a:theme>
+</file>
+
+<file path=ppt/theme/theme2.xml><?xml version="1.0" encoding="utf-8"?>
+<a:theme xmlns:a="http://schemas.openxmlformats.org/drawingml/2006/main" name="Office 佈景主題">
+  <a:themeElements>
+    <a:clrScheme name="Office">
+      <a:dk1>
+        <a:sysClr val="windowText" lastClr="000000"/>
+      </a:dk1>
+      <a:lt1>
+        <a:sysClr val="window" lastClr="FFFFFF"/>
+      </a:lt1>
+      <a:dk2>
+        <a:srgbClr val="44546A"/>
+      </a:dk2>
+      <a:lt2>
+        <a:srgbClr val="E7E6E6"/>
+      </a:lt2>
+      <a:accent1>
+        <a:srgbClr val="4472C4"/>
+      </a:accent1>
+      <a:accent2>
+        <a:srgbClr val="ED7D31"/>
+      </a:accent2>
+      <a:accent3>
+        <a:srgbClr val="A5A5A5"/>
+      </a:accent3>
+      <a:accent4>
+        <a:srgbClr val="FFC000"/>
+      </a:accent4>
+      <a:accent5>
+        <a:srgbClr val="5B9BD5"/>
+      </a:accent5>
+      <a:accent6>
+        <a:srgbClr val="70AD47"/>
+      </a:accent6>
+      <a:hlink>
+        <a:srgbClr val="0563C1"/>
+      </a:hlink>
+      <a:folHlink>
+        <a:srgbClr val="954F72"/>
+      </a:folHlink>
+    </a:clrScheme>
+    <a:fontScheme name="Office">
+      <a:majorFont>
+        <a:latin typeface="Calibri Light" panose="020F0302020204030204"/>
+        <a:ea typeface=""/>
+        <a:cs typeface=""/>
+        <a:font script="Jpan" typeface="游ゴシック Light"/>
+        <a:font script="Hang" typeface="맑은 고딕"/>
+        <a:font script="Hans" typeface="等线 Light"/>
+        <a:font script="Hant" typeface="新細明體"/>
+        <a:font script="Arab" typeface="Times New Roman"/>
+        <a:font script="Hebr" typeface="Times New Roman"/>
+        <a:font script="Thai" typeface="Angsana New"/>
+        <a:font script="Ethi" typeface="Nyala"/>
+        <a:font script="Beng" typeface="Vrinda"/>
+        <a:font script="Gujr" typeface="Shruti"/>
+        <a:font script="Khmr" typeface="MoolBoran"/>
+        <a:font script="Knda" typeface="Tunga"/>
+        <a:font script="Guru" typeface="Raavi"/>
+        <a:font script="Cans" typeface="Euphemia"/>
+        <a:font script="Cher" typeface="Plantagenet Cherokee"/>
+        <a:font script="Yiii" typeface="Microsoft Yi Baiti"/>
+        <a:font script="Tibt" typeface="Microsoft Himalaya"/>
+        <a:font script="Thaa" typeface="MV Boli"/>
+        <a:font script="Deva" typeface="Mangal"/>
+        <a:font script="Telu" typeface="Gautami"/>
+        <a:font script="Taml" typeface="Latha"/>
+        <a:font script="Syrc" typeface="Estrangelo Edessa"/>
+        <a:font script="Orya" typeface="Kalinga"/>
+        <a:font script="Mlym" typeface="Kartika"/>
+        <a:font script="Laoo" typeface="DokChampa"/>
+        <a:font script="Sinh" typeface="Iskoola Pota"/>
+        <a:font script="Mong" typeface="Mongolian Baiti"/>
+        <a:font script="Viet" typeface="Times New Roman"/>
+        <a:font script="Uigh" typeface="Microsoft Uighur"/>
+        <a:font script="Geor" typeface="Sylfaen"/>
+        <a:font script="Armn" typeface="Arial"/>
+        <a:font script="Bugi" typeface="Leelawadee UI"/>
+        <a:font script="Bopo" typeface="Microsoft JhengHei"/>
+        <a:font script="Java" typeface="Javanese Text"/>
+        <a:font script="Lisu" typeface="Segoe UI"/>
+        <a:font script="Mymr" typeface="Myanmar Text"/>
+        <a:font script="Nkoo" typeface="Ebrima"/>
+        <a:font script="Olck" typeface="Nirmala UI"/>
+        <a:font script="Osma" typeface="Ebrima"/>
+        <a:font script="Phag" typeface="Phagspa"/>
+        <a:font script="Syrn" typeface="Estrangelo Edessa"/>
+        <a:font script="Syrj" typeface="Estrangelo Edessa"/>
+        <a:font script="Syre" typeface="Estrangelo Edessa"/>
+        <a:font script="Sora" typeface="Nirmala UI"/>
+        <a:font script="Tale" typeface="Microsoft Tai Le"/>
+        <a:font script="Talu" typeface="Microsoft New Tai Lue"/>
+        <a:font script="Tfng" typeface="Ebrima"/>
+      </a:majorFont>
+      <a:minorFont>
+        <a:latin typeface="Calibri" panose="020F0502020204030204"/>
+        <a:ea typeface=""/>
+        <a:cs typeface=""/>
+        <a:font script="Jpan" typeface="游ゴシック"/>
+        <a:font script="Hang" typeface="맑은 고딕"/>
+        <a:font script="Hans" typeface="等线"/>
+        <a:font script="Hant" typeface="新細明體"/>
+        <a:font script="Arab" typeface="Arial"/>
+        <a:font script="Hebr" typeface="Arial"/>
+        <a:font script="Thai" typeface="Cordia New"/>
+        <a:font script="Ethi" typeface="Nyala"/>
+        <a:font script="Beng" typeface="Vrinda"/>
+        <a:font script="Gujr" typeface="Shruti"/>
+        <a:font script="Khmr" typeface="DaunPenh"/>
+        <a:font script="Knda" typeface="Tunga"/>
+        <a:font script="Guru" typeface="Raavi"/>
+        <a:font script="Cans" typeface="Euphemia"/>
+        <a:font script="Cher" typeface="Plantagenet Cherokee"/>
+        <a:font script="Yiii" typeface="Microsoft Yi Baiti"/>
+        <a:font script="Tibt" typeface="Microsoft Himalaya"/>
+        <a:font script="Thaa" typeface="MV Boli"/>
+        <a:font script="Deva" typeface="Mangal"/>
+        <a:font script="Telu" typeface="Gautami"/>
+        <a:font script="Taml" typeface="Latha"/>
+        <a:font script="Syrc" typeface="Estrangelo Edessa"/>
+        <a:font script="Orya" typeface="Kalinga"/>
+        <a:font script="Mlym" typeface="Kartika"/>
+        <a:font script="Laoo" typeface="DokChampa"/>
+        <a:font script="Sinh" typeface="Iskoola Pota"/>
+        <a:font script="Mong" typeface="Mongolian Baiti"/>
+        <a:font script="Viet" typeface="Arial"/>
+        <a:font script="Uigh" typeface="Microsoft Uighur"/>
+        <a:font script="Geor" typeface="Sylfaen"/>
+        <a:font script="Armn" typeface="Arial"/>
+        <a:font script="Bugi" typeface="Leelawadee UI"/>
+        <a:font script="Bopo" typeface="Microsoft JhengHei"/>
+        <a:font script="Java" typeface="Javanese Text"/>
+        <a:font script="Lisu" typeface="Segoe UI"/>
+        <a:font script="Mymr" typeface="Myanmar Text"/>
+        <a:font script="Nkoo" typeface="Ebrima"/>
+        <a:font script="Olck" typeface="Nirmala UI"/>
+        <a:font script="Osma" typeface="Ebrima"/>
+        <a:font script="Phag" typeface="Phagspa"/>
+        <a:font script="Syrn" typeface="Estrangelo Edessa"/>
+        <a:font script="Syrj" typeface="Estrangelo Edessa"/>
+        <a:font script="Syre" typeface="Estrangelo Edessa"/>
+        <a:font script="Sora" typeface="Nirmala UI"/>
+        <a:font script="Tale" typeface="Microsoft Tai Le"/>
+        <a:font script="Talu" typeface="Microsoft New Tai Lue"/>
+        <a:font script="Tfng" typeface="Ebrima"/>
+      </a:minorFont>
+    </a:fontScheme>
+    <a:fmtScheme name="Office">
+      <a:fillStyleLst>
+        <a:solidFill>
+          <a:schemeClr val="phClr"/>
+        </a:solidFill>
+        <a:gradFill rotWithShape="1">
+          <a:gsLst>
+            <a:gs pos="0">
+              <a:schemeClr val="phClr">
+                <a:lumMod val="110000"/>
+                <a:satMod val="105000"/>
+                <a:tint val="67000"/>
+              </a:schemeClr>
+            </a:gs>
+            <a:gs pos="50000">
+              <a:schemeClr val="phClr">
+                <a:lumMod val="105000"/>
+                <a:satMod val="103000"/>
+                <a:tint val="73000"/>
+              </a:schemeClr>
+            </a:gs>
+            <a:gs pos="100000">
+              <a:schemeClr val="phClr">
+                <a:lumMod val="105000"/>
+                <a:satMod val="109000"/>
+                <a:tint val="81000"/>
+              </a:schemeClr>
+            </a:gs>
+          </a:gsLst>
+          <a:lin ang="5400000" scaled="0"/>
+        </a:gradFill>
+        <a:gradFill rotWithShape="1">
+          <a:gsLst>
+            <a:gs pos="0">
+              <a:schemeClr val="phClr">
+                <a:satMod val="103000"/>
+                <a:lumMod val="102000"/>
+                <a:tint val="94000"/>
+              </a:schemeClr>
+            </a:gs>
+            <a:gs pos="50000">
+              <a:schemeClr val="phClr">
+                <a:satMod val="110000"/>
+                <a:lumMod val="100000"/>
+                <a:shade val="100000"/>
+              </a:schemeClr>
+            </a:gs>
+            <a:gs pos="100000">
+              <a:schemeClr val="phClr">
+                <a:lumMod val="99000"/>
+                <a:satMod val="120000"/>
+                <a:shade val="78000"/>
+              </a:schemeClr>
+            </a:gs>
+          </a:gsLst>
+          <a:lin ang="5400000" scaled="0"/>
+        </a:gradFill>
+      </a:fillStyleLst>
+      <a:lnStyleLst>
+        <a:ln w="6350" cap="flat" cmpd="sng" algn="ctr">
+          <a:solidFill>
+            <a:schemeClr val="phClr"/>
+          </a:solidFill>
+          <a:prstDash val="solid"/>
+          <a:miter lim="800000"/>
+        </a:ln>
+        <a:ln w="12700" cap="flat" cmpd="sng" algn="ctr">
+          <a:solidFill>
+            <a:schemeClr val="phClr"/>
+          </a:solidFill>
+          <a:prstDash val="solid"/>
+          <a:miter lim="800000"/>
+        </a:ln>
+        <a:ln w="19050" cap="flat" cmpd="sng" algn="ctr">
+          <a:solidFill>
+            <a:schemeClr val="phClr"/>
+          </a:solidFill>
+          <a:prstDash val="solid"/>
+          <a:miter lim="800000"/>
+        </a:ln>
+      </a:lnStyleLst>
+      <a:effectStyleLst>
+        <a:effectStyle>
+          <a:effectLst/>
+        </a:effectStyle>
+        <a:effectStyle>
+          <a:effectLst/>
+        </a:effectStyle>
+        <a:effectStyle>
+          <a:effectLst>
+            <a:outerShdw blurRad="57150" dist="19050" dir="5400000" algn="ctr" rotWithShape="0">
+              <a:srgbClr val="000000">
+                <a:alpha val="63000"/>
+              </a:srgbClr>
+            </a:outerShdw>
+          </a:effectLst>
+        </a:effectStyle>
+      </a:effectStyleLst>
+      <a:bgFillStyleLst>
+        <a:solidFill>
+          <a:schemeClr val="phClr"/>
+        </a:solidFill>
+        <a:solidFill>
+          <a:schemeClr val="phClr">
+            <a:tint val="95000"/>
+            <a:satMod val="170000"/>
+          </a:schemeClr>
+        </a:solidFill>
+        <a:gradFill rotWithShape="1">
+          <a:gsLst>
+            <a:gs pos="0">
+              <a:schemeClr val="phClr">
+                <a:tint val="93000"/>
+                <a:satMod val="150000"/>
+                <a:shade val="98000"/>
+                <a:lumMod val="102000"/>
+              </a:schemeClr>
+            </a:gs>
+            <a:gs pos="50000">
+              <a:schemeClr val="phClr">
+                <a:tint val="98000"/>
+                <a:satMod val="130000"/>
+                <a:shade val="90000"/>
+                <a:lumMod val="103000"/>
+              </a:schemeClr>
+            </a:gs>
+            <a:gs pos="100000">
+              <a:schemeClr val="phClr">
+                <a:shade val="63000"/>
+                <a:satMod val="120000"/>
+              </a:schemeClr>
+            </a:gs>
+          </a:gsLst>
+          <a:lin ang="5400000" scaled="0"/>
+        </a:gradFill>
+      </a:bgFillStyleLst>
+    </a:fmtScheme>
+  </a:themeElements>
+  <a:objectDefaults/>
+  <a:extraClrSchemeLst/>
+  <a:extLst>
+    <a:ext uri="{05A4C25C-085E-4340-85A3-A5531E510DB2}">
+      <thm15:themeFamily xmlns:thm15="http://schemas.microsoft.com/office/thememl/2012/main" name="Office Theme" id="{62F939B6-93AF-4DB8-9C6B-D6C7DFDC589F}" vid="{4A3C46E8-61CC-4603-A589-7422A47A8E4A}"/>
+    </a:ext>
+  </a:extLst>
+</a:theme>
 </file>
</xml_diff>

<commit_message>
set up more regex
</commit_message>
<xml_diff>
--- a/slidetemp.pptx
+++ b/slidetemp.pptx
@@ -197,7 +197,7 @@
           <a:p>
             <a:fld id="{8B2C1FF7-3CD2-7848-AA02-AAC2E9ACC631}" type="datetimeFigureOut">
               <a:rPr kumimoji="1" lang="zh-TW" altLang="en-US" smtClean="0"/>
-              <a:t>2022/10/21</a:t>
+              <a:t>2022/10/22</a:t>
             </a:fld>
             <a:endParaRPr kumimoji="1" lang="zh-TW" altLang="en-US"/>
           </a:p>
@@ -615,7 +615,7 @@
           <a:p>
             <a:fld id="{6B6E8288-18DC-6748-8F07-FCE7E33E0387}" type="datetime1">
               <a:rPr kumimoji="1" lang="zh-TW" altLang="en-US" smtClean="0"/>
-              <a:t>2022/10/21</a:t>
+              <a:t>2022/10/22</a:t>
             </a:fld>
             <a:endParaRPr kumimoji="1" lang="zh-TW" altLang="en-US"/>
           </a:p>
@@ -821,7 +821,7 @@
           <a:p>
             <a:fld id="{0E590ADA-43E4-064B-9A8D-5A88906B8E29}" type="datetime1">
               <a:rPr kumimoji="1" lang="zh-TW" altLang="en-US" smtClean="0"/>
-              <a:t>2022/10/21</a:t>
+              <a:t>2022/10/22</a:t>
             </a:fld>
             <a:endParaRPr kumimoji="1" lang="zh-TW" altLang="en-US"/>
           </a:p>
@@ -1032,7 +1032,7 @@
           <a:p>
             <a:fld id="{FBDCD0F0-79F6-E345-907A-13DAB23A575A}" type="datetime1">
               <a:rPr kumimoji="1" lang="zh-TW" altLang="en-US" smtClean="0"/>
-              <a:t>2022/10/21</a:t>
+              <a:t>2022/10/22</a:t>
             </a:fld>
             <a:endParaRPr kumimoji="1" lang="zh-TW" altLang="en-US"/>
           </a:p>
@@ -1233,7 +1233,7 @@
           <a:p>
             <a:fld id="{A0215A02-CC4D-C447-92DE-E9526678BE8F}" type="datetime1">
               <a:rPr kumimoji="1" lang="zh-TW" altLang="en-US" smtClean="0"/>
-              <a:t>2022/10/21</a:t>
+              <a:t>2022/10/22</a:t>
             </a:fld>
             <a:endParaRPr kumimoji="1" lang="zh-TW" altLang="en-US"/>
           </a:p>
@@ -1511,7 +1511,7 @@
           <a:p>
             <a:fld id="{7E85531B-CCE9-E041-8166-675B4B46487C}" type="datetime1">
               <a:rPr kumimoji="1" lang="zh-TW" altLang="en-US" smtClean="0"/>
-              <a:t>2022/10/21</a:t>
+              <a:t>2022/10/22</a:t>
             </a:fld>
             <a:endParaRPr kumimoji="1" lang="zh-TW" altLang="en-US"/>
           </a:p>
@@ -1779,7 +1779,7 @@
           <a:p>
             <a:fld id="{10E1F5DC-AE57-884A-8A7B-6146B7C0EFB4}" type="datetime1">
               <a:rPr kumimoji="1" lang="zh-TW" altLang="en-US" smtClean="0"/>
-              <a:t>2022/10/21</a:t>
+              <a:t>2022/10/22</a:t>
             </a:fld>
             <a:endParaRPr kumimoji="1" lang="zh-TW" altLang="en-US"/>
           </a:p>
@@ -2194,7 +2194,7 @@
           <a:p>
             <a:fld id="{587334C5-09FA-594C-95E1-F7D858B8824A}" type="datetime1">
               <a:rPr kumimoji="1" lang="zh-TW" altLang="en-US" smtClean="0"/>
-              <a:t>2022/10/21</a:t>
+              <a:t>2022/10/22</a:t>
             </a:fld>
             <a:endParaRPr kumimoji="1" lang="zh-TW" altLang="en-US"/>
           </a:p>
@@ -2338,7 +2338,7 @@
           <a:p>
             <a:fld id="{5F45E731-440C-5242-9E41-A519B8073901}" type="datetime1">
               <a:rPr kumimoji="1" lang="zh-TW" altLang="en-US" smtClean="0"/>
-              <a:t>2022/10/21</a:t>
+              <a:t>2022/10/22</a:t>
             </a:fld>
             <a:endParaRPr kumimoji="1" lang="zh-TW" altLang="en-US"/>
           </a:p>
@@ -2454,7 +2454,7 @@
           <a:p>
             <a:fld id="{F3396B5F-4602-D844-85E9-A35B87FB848E}" type="datetime1">
               <a:rPr kumimoji="1" lang="zh-TW" altLang="en-US" smtClean="0"/>
-              <a:t>2022/10/21</a:t>
+              <a:t>2022/10/22</a:t>
             </a:fld>
             <a:endParaRPr kumimoji="1" lang="zh-TW" altLang="en-US"/>
           </a:p>
@@ -2773,7 +2773,7 @@
           <a:p>
             <a:fld id="{0ED98EBB-8707-6242-92E0-8DE05B76A49C}" type="datetime1">
               <a:rPr kumimoji="1" lang="zh-TW" altLang="en-US" smtClean="0"/>
-              <a:t>2022/10/21</a:t>
+              <a:t>2022/10/22</a:t>
             </a:fld>
             <a:endParaRPr kumimoji="1" lang="zh-TW" altLang="en-US"/>
           </a:p>
@@ -3064,7 +3064,7 @@
           <a:p>
             <a:fld id="{20FE636C-0ADD-4D43-84F1-CB39BD3070E6}" type="datetime1">
               <a:rPr kumimoji="1" lang="zh-TW" altLang="en-US" smtClean="0"/>
-              <a:t>2022/10/21</a:t>
+              <a:t>2022/10/22</a:t>
             </a:fld>
             <a:endParaRPr kumimoji="1" lang="zh-TW" altLang="en-US"/>
           </a:p>
@@ -3180,8 +3180,8 @@
         </p:nvSpPr>
         <p:spPr>
           <a:xfrm>
-            <a:off x="838200" y="365125"/>
-            <a:ext cx="10515600" cy="1325563"/>
+            <a:off x="838200" y="365126"/>
+            <a:ext cx="10515600" cy="1085988"/>
           </a:xfrm>
           <a:prstGeom prst="rect">
             <a:avLst/>
@@ -3218,8 +3218,8 @@
         </p:nvSpPr>
         <p:spPr>
           <a:xfrm>
-            <a:off x="838200" y="1825625"/>
-            <a:ext cx="10515600" cy="4351338"/>
+            <a:off x="838200" y="1620078"/>
+            <a:ext cx="10515600" cy="4556885"/>
           </a:xfrm>
           <a:prstGeom prst="rect">
             <a:avLst/>
@@ -3308,7 +3308,7 @@
           <a:p>
             <a:fld id="{01AF8313-9347-FA4B-8E7E-62CCBCA813E5}" type="datetime1">
               <a:rPr kumimoji="1" lang="zh-TW" altLang="en-US" smtClean="0"/>
-              <a:t>2022/10/21</a:t>
+              <a:t>2022/10/22</a:t>
             </a:fld>
             <a:endParaRPr kumimoji="1" lang="zh-TW" altLang="en-US"/>
           </a:p>
@@ -3343,18 +3343,20 @@
           <a:bodyPr vert="horz" lIns="91440" tIns="45720" rIns="91440" bIns="45720" rtlCol="0" anchor="ctr"/>
           <a:lstStyle>
             <a:lvl1pPr algn="ctr">
-              <a:defRPr sz="1200">
+              <a:defRPr sz="1200" b="0" i="0">
                 <a:solidFill>
                   <a:schemeClr val="tx1">
                     <a:tint val="75000"/>
                   </a:schemeClr>
                 </a:solidFill>
+                <a:latin typeface="Noto Sans CJK SC DemiLight" panose="020B0400000000000000" pitchFamily="34" charset="-128"/>
+                <a:ea typeface="Noto Sans CJK SC DemiLight" panose="020B0400000000000000" pitchFamily="34" charset="-128"/>
               </a:defRPr>
             </a:lvl1pPr>
           </a:lstStyle>
           <a:p>
             <a:r>
-              <a:rPr kumimoji="1" lang="zh-TW" altLang="en-US"/>
+              <a:rPr kumimoji="1" lang="zh-TW" altLang="en-US" dirty="0"/>
               <a:t>蜥蜴出品</a:t>
             </a:r>
           </a:p>
@@ -3438,9 +3440,9 @@
           <a:spcPct val="0"/>
         </a:spcBef>
         <a:buNone/>
-        <a:defRPr sz="4400" b="1" kern="1200">
+        <a:defRPr sz="3600" b="1" kern="1200">
           <a:solidFill>
-            <a:schemeClr val="tx1"/>
+            <a:srgbClr val="C00000"/>
           </a:solidFill>
           <a:latin typeface="Noto Sans CJK SC Regular" panose="020B0500000000000000" pitchFamily="34" charset="-128"/>
           <a:ea typeface="Noto Sans CJK SC Regular" panose="020B0500000000000000" pitchFamily="34" charset="-128"/>
@@ -3451,17 +3453,20 @@
     <p:bodyStyle>
       <a:lvl1pPr marL="228600" indent="-228600" algn="l" defTabSz="914400" rtl="0" eaLnBrk="1" latinLnBrk="0" hangingPunct="1">
         <a:lnSpc>
-          <a:spcPct val="150000"/>
+          <a:spcPct val="100000"/>
         </a:lnSpc>
         <a:spcBef>
           <a:spcPts val="1000"/>
         </a:spcBef>
+        <a:spcAft>
+          <a:spcPts val="300"/>
+        </a:spcAft>
         <a:buClr>
           <a:srgbClr val="C00000"/>
         </a:buClr>
         <a:buFont typeface="Arial" panose="020B0604020202020204" pitchFamily="34" charset="0"/>
         <a:buChar char="•"/>
-        <a:defRPr sz="2400" kern="1200">
+        <a:defRPr sz="2000" kern="1200">
           <a:solidFill>
             <a:schemeClr val="tx1"/>
           </a:solidFill>
@@ -3472,17 +3477,20 @@
       </a:lvl1pPr>
       <a:lvl2pPr marL="685800" indent="-228600" algn="l" defTabSz="914400" rtl="0" eaLnBrk="1" latinLnBrk="0" hangingPunct="1">
         <a:lnSpc>
-          <a:spcPct val="150000"/>
+          <a:spcPct val="100000"/>
         </a:lnSpc>
         <a:spcBef>
           <a:spcPts val="500"/>
         </a:spcBef>
+        <a:spcAft>
+          <a:spcPts val="300"/>
+        </a:spcAft>
         <a:buClr>
           <a:srgbClr val="C00000"/>
         </a:buClr>
         <a:buFont typeface="Arial" panose="020B0604020202020204" pitchFamily="34" charset="0"/>
         <a:buChar char="•"/>
-        <a:defRPr sz="2400" kern="1200">
+        <a:defRPr sz="2000" kern="1200">
           <a:solidFill>
             <a:schemeClr val="tx1"/>
           </a:solidFill>
@@ -3493,17 +3501,20 @@
       </a:lvl2pPr>
       <a:lvl3pPr marL="1143000" indent="-228600" algn="l" defTabSz="914400" rtl="0" eaLnBrk="1" latinLnBrk="0" hangingPunct="1">
         <a:lnSpc>
-          <a:spcPct val="150000"/>
+          <a:spcPct val="100000"/>
         </a:lnSpc>
         <a:spcBef>
           <a:spcPts val="500"/>
         </a:spcBef>
+        <a:spcAft>
+          <a:spcPts val="300"/>
+        </a:spcAft>
         <a:buClr>
           <a:srgbClr val="C00000"/>
         </a:buClr>
         <a:buFont typeface="Arial" panose="020B0604020202020204" pitchFamily="34" charset="0"/>
         <a:buChar char="•"/>
-        <a:defRPr sz="2400" kern="1200">
+        <a:defRPr sz="2000" kern="1200">
           <a:solidFill>
             <a:schemeClr val="tx1"/>
           </a:solidFill>
@@ -3514,17 +3525,20 @@
       </a:lvl3pPr>
       <a:lvl4pPr marL="1600200" indent="-228600" algn="l" defTabSz="914400" rtl="0" eaLnBrk="1" latinLnBrk="0" hangingPunct="1">
         <a:lnSpc>
-          <a:spcPct val="150000"/>
+          <a:spcPct val="100000"/>
         </a:lnSpc>
         <a:spcBef>
           <a:spcPts val="500"/>
         </a:spcBef>
+        <a:spcAft>
+          <a:spcPts val="300"/>
+        </a:spcAft>
         <a:buClr>
           <a:srgbClr val="C00000"/>
         </a:buClr>
         <a:buFont typeface="Arial" panose="020B0604020202020204" pitchFamily="34" charset="0"/>
         <a:buChar char="•"/>
-        <a:defRPr sz="2400" kern="1200">
+        <a:defRPr sz="2000" kern="1200">
           <a:solidFill>
             <a:schemeClr val="tx1"/>
           </a:solidFill>
@@ -3535,17 +3549,20 @@
       </a:lvl4pPr>
       <a:lvl5pPr marL="2057400" indent="-228600" algn="l" defTabSz="914400" rtl="0" eaLnBrk="1" latinLnBrk="0" hangingPunct="1">
         <a:lnSpc>
-          <a:spcPct val="150000"/>
+          <a:spcPct val="100000"/>
         </a:lnSpc>
         <a:spcBef>
           <a:spcPts val="500"/>
         </a:spcBef>
+        <a:spcAft>
+          <a:spcPts val="300"/>
+        </a:spcAft>
         <a:buClr>
           <a:srgbClr val="C00000"/>
         </a:buClr>
         <a:buFont typeface="Arial" panose="020B0604020202020204" pitchFamily="34" charset="0"/>
         <a:buChar char="•"/>
-        <a:defRPr sz="2400" kern="1200">
+        <a:defRPr sz="2000" kern="1200">
           <a:solidFill>
             <a:schemeClr val="tx1"/>
           </a:solidFill>

</xml_diff>

<commit_message>
check: is blank line or not
</commit_message>
<xml_diff>
--- a/slidetemp.pptx
+++ b/slidetemp.pptx
@@ -197,7 +197,7 @@
           <a:p>
             <a:fld id="{8B2C1FF7-3CD2-7848-AA02-AAC2E9ACC631}" type="datetimeFigureOut">
               <a:rPr kumimoji="1" lang="zh-TW" altLang="en-US" smtClean="0"/>
-              <a:t>2022/10/22</a:t>
+              <a:t>2022/10/23</a:t>
             </a:fld>
             <a:endParaRPr kumimoji="1" lang="zh-TW" altLang="en-US"/>
           </a:p>
@@ -511,6 +511,7 @@
                 <a:solidFill>
                   <a:srgbClr val="C00000"/>
                 </a:solidFill>
+                <a:latin typeface="Helvetica" pitchFamily="2" charset="0"/>
               </a:defRPr>
             </a:lvl1pPr>
           </a:lstStyle>
@@ -586,7 +587,7 @@
           </a:lstStyle>
           <a:p>
             <a:r>
-              <a:rPr kumimoji="1" lang="zh-TW" altLang="en-US"/>
+              <a:rPr kumimoji="1" lang="zh-TW" altLang="en-US" dirty="0"/>
               <a:t>按一下以編輯母片子標題樣式</a:t>
             </a:r>
           </a:p>
@@ -615,7 +616,7 @@
           <a:p>
             <a:fld id="{6B6E8288-18DC-6748-8F07-FCE7E33E0387}" type="datetime1">
               <a:rPr kumimoji="1" lang="zh-TW" altLang="en-US" smtClean="0"/>
-              <a:t>2022/10/22</a:t>
+              <a:t>2022/10/23</a:t>
             </a:fld>
             <a:endParaRPr kumimoji="1" lang="zh-TW" altLang="en-US"/>
           </a:p>
@@ -821,7 +822,7 @@
           <a:p>
             <a:fld id="{0E590ADA-43E4-064B-9A8D-5A88906B8E29}" type="datetime1">
               <a:rPr kumimoji="1" lang="zh-TW" altLang="en-US" smtClean="0"/>
-              <a:t>2022/10/22</a:t>
+              <a:t>2022/10/23</a:t>
             </a:fld>
             <a:endParaRPr kumimoji="1" lang="zh-TW" altLang="en-US"/>
           </a:p>
@@ -1032,7 +1033,7 @@
           <a:p>
             <a:fld id="{FBDCD0F0-79F6-E345-907A-13DAB23A575A}" type="datetime1">
               <a:rPr kumimoji="1" lang="zh-TW" altLang="en-US" smtClean="0"/>
-              <a:t>2022/10/22</a:t>
+              <a:t>2022/10/23</a:t>
             </a:fld>
             <a:endParaRPr kumimoji="1" lang="zh-TW" altLang="en-US"/>
           </a:p>
@@ -1172,7 +1173,33 @@
         <p:spPr/>
         <p:txBody>
           <a:bodyPr/>
-          <a:lstStyle/>
+          <a:lstStyle>
+            <a:lvl1pPr>
+              <a:defRPr>
+                <a:latin typeface="Helvetica" pitchFamily="2" charset="0"/>
+              </a:defRPr>
+            </a:lvl1pPr>
+            <a:lvl2pPr>
+              <a:defRPr>
+                <a:latin typeface="Helvetica" pitchFamily="2" charset="0"/>
+              </a:defRPr>
+            </a:lvl2pPr>
+            <a:lvl3pPr>
+              <a:defRPr>
+                <a:latin typeface="Helvetica" pitchFamily="2" charset="0"/>
+              </a:defRPr>
+            </a:lvl3pPr>
+            <a:lvl4pPr>
+              <a:defRPr>
+                <a:latin typeface="Helvetica" pitchFamily="2" charset="0"/>
+              </a:defRPr>
+            </a:lvl4pPr>
+            <a:lvl5pPr>
+              <a:defRPr>
+                <a:latin typeface="Helvetica" pitchFamily="2" charset="0"/>
+              </a:defRPr>
+            </a:lvl5pPr>
+          </a:lstStyle>
           <a:p>
             <a:pPr lvl="0"/>
             <a:r>
@@ -1233,7 +1260,7 @@
           <a:p>
             <a:fld id="{A0215A02-CC4D-C447-92DE-E9526678BE8F}" type="datetime1">
               <a:rPr kumimoji="1" lang="zh-TW" altLang="en-US" smtClean="0"/>
-              <a:t>2022/10/22</a:t>
+              <a:t>2022/10/23</a:t>
             </a:fld>
             <a:endParaRPr kumimoji="1" lang="zh-TW" altLang="en-US"/>
           </a:p>
@@ -1511,7 +1538,7 @@
           <a:p>
             <a:fld id="{7E85531B-CCE9-E041-8166-675B4B46487C}" type="datetime1">
               <a:rPr kumimoji="1" lang="zh-TW" altLang="en-US" smtClean="0"/>
-              <a:t>2022/10/22</a:t>
+              <a:t>2022/10/23</a:t>
             </a:fld>
             <a:endParaRPr kumimoji="1" lang="zh-TW" altLang="en-US"/>
           </a:p>
@@ -1779,7 +1806,7 @@
           <a:p>
             <a:fld id="{10E1F5DC-AE57-884A-8A7B-6146B7C0EFB4}" type="datetime1">
               <a:rPr kumimoji="1" lang="zh-TW" altLang="en-US" smtClean="0"/>
-              <a:t>2022/10/22</a:t>
+              <a:t>2022/10/23</a:t>
             </a:fld>
             <a:endParaRPr kumimoji="1" lang="zh-TW" altLang="en-US"/>
           </a:p>
@@ -2194,7 +2221,7 @@
           <a:p>
             <a:fld id="{587334C5-09FA-594C-95E1-F7D858B8824A}" type="datetime1">
               <a:rPr kumimoji="1" lang="zh-TW" altLang="en-US" smtClean="0"/>
-              <a:t>2022/10/22</a:t>
+              <a:t>2022/10/23</a:t>
             </a:fld>
             <a:endParaRPr kumimoji="1" lang="zh-TW" altLang="en-US"/>
           </a:p>
@@ -2338,7 +2365,7 @@
           <a:p>
             <a:fld id="{5F45E731-440C-5242-9E41-A519B8073901}" type="datetime1">
               <a:rPr kumimoji="1" lang="zh-TW" altLang="en-US" smtClean="0"/>
-              <a:t>2022/10/22</a:t>
+              <a:t>2022/10/23</a:t>
             </a:fld>
             <a:endParaRPr kumimoji="1" lang="zh-TW" altLang="en-US"/>
           </a:p>
@@ -2454,7 +2481,7 @@
           <a:p>
             <a:fld id="{F3396B5F-4602-D844-85E9-A35B87FB848E}" type="datetime1">
               <a:rPr kumimoji="1" lang="zh-TW" altLang="en-US" smtClean="0"/>
-              <a:t>2022/10/22</a:t>
+              <a:t>2022/10/23</a:t>
             </a:fld>
             <a:endParaRPr kumimoji="1" lang="zh-TW" altLang="en-US"/>
           </a:p>
@@ -2773,7 +2800,7 @@
           <a:p>
             <a:fld id="{0ED98EBB-8707-6242-92E0-8DE05B76A49C}" type="datetime1">
               <a:rPr kumimoji="1" lang="zh-TW" altLang="en-US" smtClean="0"/>
-              <a:t>2022/10/22</a:t>
+              <a:t>2022/10/23</a:t>
             </a:fld>
             <a:endParaRPr kumimoji="1" lang="zh-TW" altLang="en-US"/>
           </a:p>
@@ -3096,7 +3123,7 @@
           <a:p>
             <a:fld id="{20FE636C-0ADD-4D43-84F1-CB39BD3070E6}" type="datetime1">
               <a:rPr kumimoji="1" lang="zh-TW" altLang="en-US" smtClean="0"/>
-              <a:t>2022/10/22</a:t>
+              <a:t>2022/10/23</a:t>
             </a:fld>
             <a:endParaRPr kumimoji="1" lang="zh-TW" altLang="en-US"/>
           </a:p>
@@ -3340,7 +3367,7 @@
           <a:p>
             <a:fld id="{01AF8313-9347-FA4B-8E7E-62CCBCA813E5}" type="datetime1">
               <a:rPr kumimoji="1" lang="zh-TW" altLang="en-US" smtClean="0"/>
-              <a:t>2022/10/22</a:t>
+              <a:t>2022/10/23</a:t>
             </a:fld>
             <a:endParaRPr kumimoji="1" lang="zh-TW" altLang="en-US"/>
           </a:p>
@@ -3502,7 +3529,7 @@
           <a:solidFill>
             <a:schemeClr val="tx1"/>
           </a:solidFill>
-          <a:latin typeface="Noto Sans CJK SC Regular" panose="020B0500000000000000" pitchFamily="34" charset="-128"/>
+          <a:latin typeface="Helvetica" pitchFamily="2" charset="0"/>
           <a:ea typeface="Noto Sans CJK SC Regular" panose="020B0500000000000000" pitchFamily="34" charset="-128"/>
           <a:cs typeface="+mn-cs"/>
         </a:defRPr>
@@ -3526,7 +3553,7 @@
           <a:solidFill>
             <a:schemeClr val="tx1"/>
           </a:solidFill>
-          <a:latin typeface="Noto Sans CJK SC Regular" panose="020B0500000000000000" pitchFamily="34" charset="-128"/>
+          <a:latin typeface="Helvetica" pitchFamily="2" charset="0"/>
           <a:ea typeface="Noto Sans CJK SC Regular" panose="020B0500000000000000" pitchFamily="34" charset="-128"/>
           <a:cs typeface="+mn-cs"/>
         </a:defRPr>
@@ -3550,7 +3577,7 @@
           <a:solidFill>
             <a:schemeClr val="tx1"/>
           </a:solidFill>
-          <a:latin typeface="Noto Sans CJK SC Regular" panose="020B0500000000000000" pitchFamily="34" charset="-128"/>
+          <a:latin typeface="Helvetica" pitchFamily="2" charset="0"/>
           <a:ea typeface="Noto Sans CJK SC Regular" panose="020B0500000000000000" pitchFamily="34" charset="-128"/>
           <a:cs typeface="+mn-cs"/>
         </a:defRPr>
@@ -3574,7 +3601,7 @@
           <a:solidFill>
             <a:schemeClr val="tx1"/>
           </a:solidFill>
-          <a:latin typeface="Noto Sans CJK SC Regular" panose="020B0500000000000000" pitchFamily="34" charset="-128"/>
+          <a:latin typeface="Helvetica" pitchFamily="2" charset="0"/>
           <a:ea typeface="Noto Sans CJK SC Regular" panose="020B0500000000000000" pitchFamily="34" charset="-128"/>
           <a:cs typeface="+mn-cs"/>
         </a:defRPr>
@@ -3598,7 +3625,7 @@
           <a:solidFill>
             <a:schemeClr val="tx1"/>
           </a:solidFill>
-          <a:latin typeface="Noto Sans CJK SC Regular" panose="020B0500000000000000" pitchFamily="34" charset="-128"/>
+          <a:latin typeface="Helvetica" pitchFamily="2" charset="0"/>
           <a:ea typeface="Noto Sans CJK SC Regular" panose="020B0500000000000000" pitchFamily="34" charset="-128"/>
           <a:cs typeface="+mn-cs"/>
         </a:defRPr>

</xml_diff>

<commit_message>
TODO: fix figure/table  problem
</commit_message>
<xml_diff>
--- a/slidetemp.pptx
+++ b/slidetemp.pptx
@@ -2617,7 +2617,7 @@
         </p:nvSpPr>
         <p:spPr>
           <a:xfrm>
-            <a:off x="8522851" y="362607"/>
+            <a:off x="671624" y="446690"/>
             <a:ext cx="3198812" cy="1112838"/>
           </a:xfrm>
         </p:spPr>
@@ -2656,8 +2656,8 @@
         </p:nvSpPr>
         <p:spPr>
           <a:xfrm>
-            <a:off x="-1" y="9252"/>
-            <a:ext cx="8208579" cy="6848748"/>
+            <a:off x="4332891" y="446690"/>
+            <a:ext cx="7564820" cy="5565228"/>
           </a:xfrm>
         </p:spPr>
         <p:txBody>
@@ -2746,7 +2746,7 @@
         </p:nvSpPr>
         <p:spPr>
           <a:xfrm>
-            <a:off x="8522851" y="1801382"/>
+            <a:off x="671624" y="1885465"/>
             <a:ext cx="3198812" cy="4229031"/>
           </a:xfrm>
         </p:spPr>

</xml_diff>